<commit_message>
Some updates to lin-alg
</commit_message>
<xml_diff>
--- a/Week4/Week4 Class1.pptx
+++ b/Week4/Week4 Class1.pptx
@@ -264,7 +264,7 @@
           <a:p>
             <a:fld id="{B8D77AF6-A889-47AE-BAD0-97FA89C4185F}" type="datetimeFigureOut">
               <a:rPr lang="en-US" smtClean="0"/>
-              <a:t>10/21/2016</a:t>
+              <a:t>11/3/2016</a:t>
             </a:fld>
             <a:endParaRPr lang="en-US"/>
           </a:p>
@@ -432,7 +432,7 @@
           <a:p>
             <a:fld id="{B8D77AF6-A889-47AE-BAD0-97FA89C4185F}" type="datetimeFigureOut">
               <a:rPr lang="en-US" smtClean="0"/>
-              <a:t>10/21/2016</a:t>
+              <a:t>11/3/2016</a:t>
             </a:fld>
             <a:endParaRPr lang="en-US"/>
           </a:p>
@@ -610,7 +610,7 @@
           <a:p>
             <a:fld id="{B8D77AF6-A889-47AE-BAD0-97FA89C4185F}" type="datetimeFigureOut">
               <a:rPr lang="en-US" smtClean="0"/>
-              <a:t>10/21/2016</a:t>
+              <a:t>11/3/2016</a:t>
             </a:fld>
             <a:endParaRPr lang="en-US"/>
           </a:p>
@@ -778,7 +778,7 @@
           <a:p>
             <a:fld id="{B8D77AF6-A889-47AE-BAD0-97FA89C4185F}" type="datetimeFigureOut">
               <a:rPr lang="en-US" smtClean="0"/>
-              <a:t>10/21/2016</a:t>
+              <a:t>11/3/2016</a:t>
             </a:fld>
             <a:endParaRPr lang="en-US"/>
           </a:p>
@@ -1023,7 +1023,7 @@
           <a:p>
             <a:fld id="{B8D77AF6-A889-47AE-BAD0-97FA89C4185F}" type="datetimeFigureOut">
               <a:rPr lang="en-US" smtClean="0"/>
-              <a:t>10/21/2016</a:t>
+              <a:t>11/3/2016</a:t>
             </a:fld>
             <a:endParaRPr lang="en-US"/>
           </a:p>
@@ -1252,7 +1252,7 @@
           <a:p>
             <a:fld id="{B8D77AF6-A889-47AE-BAD0-97FA89C4185F}" type="datetimeFigureOut">
               <a:rPr lang="en-US" smtClean="0"/>
-              <a:t>10/21/2016</a:t>
+              <a:t>11/3/2016</a:t>
             </a:fld>
             <a:endParaRPr lang="en-US"/>
           </a:p>
@@ -1616,7 +1616,7 @@
           <a:p>
             <a:fld id="{B8D77AF6-A889-47AE-BAD0-97FA89C4185F}" type="datetimeFigureOut">
               <a:rPr lang="en-US" smtClean="0"/>
-              <a:t>10/21/2016</a:t>
+              <a:t>11/3/2016</a:t>
             </a:fld>
             <a:endParaRPr lang="en-US"/>
           </a:p>
@@ -1733,7 +1733,7 @@
           <a:p>
             <a:fld id="{B8D77AF6-A889-47AE-BAD0-97FA89C4185F}" type="datetimeFigureOut">
               <a:rPr lang="en-US" smtClean="0"/>
-              <a:t>10/21/2016</a:t>
+              <a:t>11/3/2016</a:t>
             </a:fld>
             <a:endParaRPr lang="en-US"/>
           </a:p>
@@ -1828,7 +1828,7 @@
           <a:p>
             <a:fld id="{B8D77AF6-A889-47AE-BAD0-97FA89C4185F}" type="datetimeFigureOut">
               <a:rPr lang="en-US" smtClean="0"/>
-              <a:t>10/21/2016</a:t>
+              <a:t>11/3/2016</a:t>
             </a:fld>
             <a:endParaRPr lang="en-US"/>
           </a:p>
@@ -2103,7 +2103,7 @@
           <a:p>
             <a:fld id="{B8D77AF6-A889-47AE-BAD0-97FA89C4185F}" type="datetimeFigureOut">
               <a:rPr lang="en-US" smtClean="0"/>
-              <a:t>10/21/2016</a:t>
+              <a:t>11/3/2016</a:t>
             </a:fld>
             <a:endParaRPr lang="en-US"/>
           </a:p>
@@ -2355,7 +2355,7 @@
           <a:p>
             <a:fld id="{B8D77AF6-A889-47AE-BAD0-97FA89C4185F}" type="datetimeFigureOut">
               <a:rPr lang="en-US" smtClean="0"/>
-              <a:t>10/21/2016</a:t>
+              <a:t>11/3/2016</a:t>
             </a:fld>
             <a:endParaRPr lang="en-US"/>
           </a:p>
@@ -2566,7 +2566,7 @@
           <a:p>
             <a:fld id="{B8D77AF6-A889-47AE-BAD0-97FA89C4185F}" type="datetimeFigureOut">
               <a:rPr lang="en-US" smtClean="0"/>
-              <a:t>10/21/2016</a:t>
+              <a:t>11/3/2016</a:t>
             </a:fld>
             <a:endParaRPr lang="en-US"/>
           </a:p>
@@ -7423,29 +7423,7 @@
           <a:p>
             <a:r>
               <a:rPr lang="en-US" dirty="0"/>
-              <a:t>Image Matrices</a:t>
-            </a:r>
-          </a:p>
-        </p:txBody>
-      </p:sp>
-      <p:sp>
-        <p:nvSpPr>
-          <p:cNvPr id="3" name="Content Placeholder 2"/>
-          <p:cNvSpPr>
-            <a:spLocks noGrp="1"/>
-          </p:cNvSpPr>
-          <p:nvPr>
-            <p:ph idx="1"/>
-          </p:nvPr>
-        </p:nvSpPr>
-        <p:spPr/>
-        <p:txBody>
-          <a:bodyPr/>
-          <a:lstStyle/>
-          <a:p>
-            <a:r>
-              <a:rPr lang="en-US" dirty="0"/>
-              <a:t>Picture of class, edit matrix directly</a:t>
+              <a:t>Let’s Explore!</a:t>
             </a:r>
           </a:p>
         </p:txBody>

</xml_diff>

<commit_message>
Mostly done with LA
</commit_message>
<xml_diff>
--- a/Week4/Week4 Class1.pptx
+++ b/Week4/Week4 Class1.pptx
@@ -27,8 +27,9 @@
     <p:sldId id="272" r:id="rId21"/>
     <p:sldId id="277" r:id="rId22"/>
     <p:sldId id="279" r:id="rId23"/>
-    <p:sldId id="273" r:id="rId24"/>
-    <p:sldId id="278" r:id="rId25"/>
+    <p:sldId id="280" r:id="rId24"/>
+    <p:sldId id="273" r:id="rId25"/>
+    <p:sldId id="278" r:id="rId26"/>
   </p:sldIdLst>
   <p:sldSz cx="12192000" cy="6858000"/>
   <p:notesSz cx="6858000" cy="9144000"/>
@@ -264,7 +265,7 @@
           <a:p>
             <a:fld id="{B8D77AF6-A889-47AE-BAD0-97FA89C4185F}" type="datetimeFigureOut">
               <a:rPr lang="en-US" smtClean="0"/>
-              <a:t>11/3/2016</a:t>
+              <a:t>11/9/2016</a:t>
             </a:fld>
             <a:endParaRPr lang="en-US"/>
           </a:p>
@@ -432,7 +433,7 @@
           <a:p>
             <a:fld id="{B8D77AF6-A889-47AE-BAD0-97FA89C4185F}" type="datetimeFigureOut">
               <a:rPr lang="en-US" smtClean="0"/>
-              <a:t>11/3/2016</a:t>
+              <a:t>11/9/2016</a:t>
             </a:fld>
             <a:endParaRPr lang="en-US"/>
           </a:p>
@@ -610,7 +611,7 @@
           <a:p>
             <a:fld id="{B8D77AF6-A889-47AE-BAD0-97FA89C4185F}" type="datetimeFigureOut">
               <a:rPr lang="en-US" smtClean="0"/>
-              <a:t>11/3/2016</a:t>
+              <a:t>11/9/2016</a:t>
             </a:fld>
             <a:endParaRPr lang="en-US"/>
           </a:p>
@@ -778,7 +779,7 @@
           <a:p>
             <a:fld id="{B8D77AF6-A889-47AE-BAD0-97FA89C4185F}" type="datetimeFigureOut">
               <a:rPr lang="en-US" smtClean="0"/>
-              <a:t>11/3/2016</a:t>
+              <a:t>11/9/2016</a:t>
             </a:fld>
             <a:endParaRPr lang="en-US"/>
           </a:p>
@@ -1023,7 +1024,7 @@
           <a:p>
             <a:fld id="{B8D77AF6-A889-47AE-BAD0-97FA89C4185F}" type="datetimeFigureOut">
               <a:rPr lang="en-US" smtClean="0"/>
-              <a:t>11/3/2016</a:t>
+              <a:t>11/9/2016</a:t>
             </a:fld>
             <a:endParaRPr lang="en-US"/>
           </a:p>
@@ -1252,7 +1253,7 @@
           <a:p>
             <a:fld id="{B8D77AF6-A889-47AE-BAD0-97FA89C4185F}" type="datetimeFigureOut">
               <a:rPr lang="en-US" smtClean="0"/>
-              <a:t>11/3/2016</a:t>
+              <a:t>11/9/2016</a:t>
             </a:fld>
             <a:endParaRPr lang="en-US"/>
           </a:p>
@@ -1616,7 +1617,7 @@
           <a:p>
             <a:fld id="{B8D77AF6-A889-47AE-BAD0-97FA89C4185F}" type="datetimeFigureOut">
               <a:rPr lang="en-US" smtClean="0"/>
-              <a:t>11/3/2016</a:t>
+              <a:t>11/9/2016</a:t>
             </a:fld>
             <a:endParaRPr lang="en-US"/>
           </a:p>
@@ -1733,7 +1734,7 @@
           <a:p>
             <a:fld id="{B8D77AF6-A889-47AE-BAD0-97FA89C4185F}" type="datetimeFigureOut">
               <a:rPr lang="en-US" smtClean="0"/>
-              <a:t>11/3/2016</a:t>
+              <a:t>11/9/2016</a:t>
             </a:fld>
             <a:endParaRPr lang="en-US"/>
           </a:p>
@@ -1828,7 +1829,7 @@
           <a:p>
             <a:fld id="{B8D77AF6-A889-47AE-BAD0-97FA89C4185F}" type="datetimeFigureOut">
               <a:rPr lang="en-US" smtClean="0"/>
-              <a:t>11/3/2016</a:t>
+              <a:t>11/9/2016</a:t>
             </a:fld>
             <a:endParaRPr lang="en-US"/>
           </a:p>
@@ -2103,7 +2104,7 @@
           <a:p>
             <a:fld id="{B8D77AF6-A889-47AE-BAD0-97FA89C4185F}" type="datetimeFigureOut">
               <a:rPr lang="en-US" smtClean="0"/>
-              <a:t>11/3/2016</a:t>
+              <a:t>11/9/2016</a:t>
             </a:fld>
             <a:endParaRPr lang="en-US"/>
           </a:p>
@@ -2355,7 +2356,7 @@
           <a:p>
             <a:fld id="{B8D77AF6-A889-47AE-BAD0-97FA89C4185F}" type="datetimeFigureOut">
               <a:rPr lang="en-US" smtClean="0"/>
-              <a:t>11/3/2016</a:t>
+              <a:t>11/9/2016</a:t>
             </a:fld>
             <a:endParaRPr lang="en-US"/>
           </a:p>
@@ -2566,7 +2567,7 @@
           <a:p>
             <a:fld id="{B8D77AF6-A889-47AE-BAD0-97FA89C4185F}" type="datetimeFigureOut">
               <a:rPr lang="en-US" smtClean="0"/>
-              <a:t>11/3/2016</a:t>
+              <a:t>11/9/2016</a:t>
             </a:fld>
             <a:endParaRPr lang="en-US"/>
           </a:p>
@@ -7423,6 +7424,561 @@
           <a:p>
             <a:r>
               <a:rPr lang="en-US" dirty="0"/>
+              <a:t>Variation as Information</a:t>
+            </a:r>
+          </a:p>
+        </p:txBody>
+      </p:sp>
+      <p:graphicFrame>
+        <p:nvGraphicFramePr>
+          <p:cNvPr id="4" name="Content Placeholder 3"/>
+          <p:cNvGraphicFramePr>
+            <a:graphicFrameLocks noGrp="1"/>
+          </p:cNvGraphicFramePr>
+          <p:nvPr>
+            <p:ph idx="1"/>
+            <p:extLst>
+              <p:ext uri="{D42A27DB-BD31-4B8C-83A1-F6EECF244321}">
+                <p14:modId xmlns:p14="http://schemas.microsoft.com/office/powerpoint/2010/main" val="3878326323"/>
+              </p:ext>
+            </p:extLst>
+          </p:nvPr>
+        </p:nvGraphicFramePr>
+        <p:xfrm>
+          <a:off x="838200" y="1825625"/>
+          <a:ext cx="7494915" cy="2545692"/>
+        </p:xfrm>
+        <a:graphic>
+          <a:graphicData uri="http://schemas.openxmlformats.org/drawingml/2006/table">
+            <a:tbl>
+              <a:tblPr firstRow="1" bandRow="1">
+                <a:tableStyleId>{5C22544A-7EE6-4342-B048-85BDC9FD1C3A}</a:tableStyleId>
+              </a:tblPr>
+              <a:tblGrid>
+                <a:gridCol w="1498983">
+                  <a:extLst>
+                    <a:ext uri="{9D8B030D-6E8A-4147-A177-3AD203B41FA5}">
+                      <a16:colId xmlns:a16="http://schemas.microsoft.com/office/drawing/2014/main" val="1638069510"/>
+                    </a:ext>
+                  </a:extLst>
+                </a:gridCol>
+                <a:gridCol w="1498983">
+                  <a:extLst>
+                    <a:ext uri="{9D8B030D-6E8A-4147-A177-3AD203B41FA5}">
+                      <a16:colId xmlns:a16="http://schemas.microsoft.com/office/drawing/2014/main" val="2151119541"/>
+                    </a:ext>
+                  </a:extLst>
+                </a:gridCol>
+                <a:gridCol w="1498983">
+                  <a:extLst>
+                    <a:ext uri="{9D8B030D-6E8A-4147-A177-3AD203B41FA5}">
+                      <a16:colId xmlns:a16="http://schemas.microsoft.com/office/drawing/2014/main" val="2581859998"/>
+                    </a:ext>
+                  </a:extLst>
+                </a:gridCol>
+                <a:gridCol w="1498983">
+                  <a:extLst>
+                    <a:ext uri="{9D8B030D-6E8A-4147-A177-3AD203B41FA5}">
+                      <a16:colId xmlns:a16="http://schemas.microsoft.com/office/drawing/2014/main" val="1096669762"/>
+                    </a:ext>
+                  </a:extLst>
+                </a:gridCol>
+                <a:gridCol w="1498983">
+                  <a:extLst>
+                    <a:ext uri="{9D8B030D-6E8A-4147-A177-3AD203B41FA5}">
+                      <a16:colId xmlns:a16="http://schemas.microsoft.com/office/drawing/2014/main" val="2171147250"/>
+                    </a:ext>
+                  </a:extLst>
+                </a:gridCol>
+              </a:tblGrid>
+              <a:tr h="424282">
+                <a:tc>
+                  <a:txBody>
+                    <a:bodyPr/>
+                    <a:lstStyle/>
+                    <a:p>
+                      <a:r>
+                        <a:rPr lang="en-US" dirty="0"/>
+                        <a:t>Age</a:t>
+                      </a:r>
+                    </a:p>
+                  </a:txBody>
+                  <a:tcPr/>
+                </a:tc>
+                <a:tc>
+                  <a:txBody>
+                    <a:bodyPr/>
+                    <a:lstStyle/>
+                    <a:p>
+                      <a:r>
+                        <a:rPr lang="en-US" dirty="0"/>
+                        <a:t>Gender</a:t>
+                      </a:r>
+                    </a:p>
+                  </a:txBody>
+                  <a:tcPr/>
+                </a:tc>
+                <a:tc>
+                  <a:txBody>
+                    <a:bodyPr/>
+                    <a:lstStyle/>
+                    <a:p>
+                      <a:r>
+                        <a:rPr lang="en-US" dirty="0"/>
+                        <a:t># of Accounts</a:t>
+                      </a:r>
+                    </a:p>
+                  </a:txBody>
+                  <a:tcPr/>
+                </a:tc>
+                <a:tc>
+                  <a:txBody>
+                    <a:bodyPr/>
+                    <a:lstStyle/>
+                    <a:p>
+                      <a:r>
+                        <a:rPr lang="en-US" dirty="0"/>
+                        <a:t>Rewards</a:t>
+                      </a:r>
+                      <a:r>
+                        <a:rPr lang="en-US" baseline="0" dirty="0"/>
+                        <a:t> Tier</a:t>
+                      </a:r>
+                      <a:endParaRPr lang="en-US" dirty="0"/>
+                    </a:p>
+                  </a:txBody>
+                  <a:tcPr/>
+                </a:tc>
+                <a:tc>
+                  <a:txBody>
+                    <a:bodyPr/>
+                    <a:lstStyle/>
+                    <a:p>
+                      <a:r>
+                        <a:rPr lang="en-US" dirty="0"/>
+                        <a:t>Balance</a:t>
+                      </a:r>
+                    </a:p>
+                  </a:txBody>
+                  <a:tcPr/>
+                </a:tc>
+                <a:extLst>
+                  <a:ext uri="{0D108BD9-81ED-4DB2-BD59-A6C34878D82A}">
+                    <a16:rowId xmlns:a16="http://schemas.microsoft.com/office/drawing/2014/main" val="2914041268"/>
+                  </a:ext>
+                </a:extLst>
+              </a:tr>
+              <a:tr h="424282">
+                <a:tc>
+                  <a:txBody>
+                    <a:bodyPr/>
+                    <a:lstStyle/>
+                    <a:p>
+                      <a:r>
+                        <a:rPr lang="en-US" dirty="0"/>
+                        <a:t>25</a:t>
+                      </a:r>
+                    </a:p>
+                  </a:txBody>
+                  <a:tcPr/>
+                </a:tc>
+                <a:tc>
+                  <a:txBody>
+                    <a:bodyPr/>
+                    <a:lstStyle/>
+                    <a:p>
+                      <a:r>
+                        <a:rPr lang="en-US" dirty="0"/>
+                        <a:t>M</a:t>
+                      </a:r>
+                    </a:p>
+                  </a:txBody>
+                  <a:tcPr/>
+                </a:tc>
+                <a:tc>
+                  <a:txBody>
+                    <a:bodyPr/>
+                    <a:lstStyle/>
+                    <a:p>
+                      <a:r>
+                        <a:rPr lang="en-US" dirty="0"/>
+                        <a:t>3</a:t>
+                      </a:r>
+                    </a:p>
+                  </a:txBody>
+                  <a:tcPr/>
+                </a:tc>
+                <a:tc>
+                  <a:txBody>
+                    <a:bodyPr/>
+                    <a:lstStyle/>
+                    <a:p>
+                      <a:r>
+                        <a:rPr lang="en-US" dirty="0"/>
+                        <a:t>Gold</a:t>
+                      </a:r>
+                    </a:p>
+                  </a:txBody>
+                  <a:tcPr/>
+                </a:tc>
+                <a:tc>
+                  <a:txBody>
+                    <a:bodyPr/>
+                    <a:lstStyle/>
+                    <a:p>
+                      <a:r>
+                        <a:rPr lang="en-US" dirty="0"/>
+                        <a:t>10124</a:t>
+                      </a:r>
+                    </a:p>
+                  </a:txBody>
+                  <a:tcPr/>
+                </a:tc>
+                <a:extLst>
+                  <a:ext uri="{0D108BD9-81ED-4DB2-BD59-A6C34878D82A}">
+                    <a16:rowId xmlns:a16="http://schemas.microsoft.com/office/drawing/2014/main" val="3575728850"/>
+                  </a:ext>
+                </a:extLst>
+              </a:tr>
+              <a:tr h="424282">
+                <a:tc>
+                  <a:txBody>
+                    <a:bodyPr/>
+                    <a:lstStyle/>
+                    <a:p>
+                      <a:r>
+                        <a:rPr lang="en-US" dirty="0"/>
+                        <a:t>24</a:t>
+                      </a:r>
+                    </a:p>
+                  </a:txBody>
+                  <a:tcPr/>
+                </a:tc>
+                <a:tc>
+                  <a:txBody>
+                    <a:bodyPr/>
+                    <a:lstStyle/>
+                    <a:p>
+                      <a:r>
+                        <a:rPr lang="en-US" dirty="0"/>
+                        <a:t>F</a:t>
+                      </a:r>
+                    </a:p>
+                  </a:txBody>
+                  <a:tcPr/>
+                </a:tc>
+                <a:tc>
+                  <a:txBody>
+                    <a:bodyPr/>
+                    <a:lstStyle/>
+                    <a:p>
+                      <a:r>
+                        <a:rPr lang="en-US" dirty="0"/>
+                        <a:t>3</a:t>
+                      </a:r>
+                    </a:p>
+                  </a:txBody>
+                  <a:tcPr/>
+                </a:tc>
+                <a:tc>
+                  <a:txBody>
+                    <a:bodyPr/>
+                    <a:lstStyle/>
+                    <a:p>
+                      <a:r>
+                        <a:rPr lang="en-US" dirty="0"/>
+                        <a:t>Bronze</a:t>
+                      </a:r>
+                    </a:p>
+                  </a:txBody>
+                  <a:tcPr/>
+                </a:tc>
+                <a:tc>
+                  <a:txBody>
+                    <a:bodyPr/>
+                    <a:lstStyle/>
+                    <a:p>
+                      <a:r>
+                        <a:rPr lang="en-US" dirty="0"/>
+                        <a:t>1200</a:t>
+                      </a:r>
+                    </a:p>
+                  </a:txBody>
+                  <a:tcPr/>
+                </a:tc>
+                <a:extLst>
+                  <a:ext uri="{0D108BD9-81ED-4DB2-BD59-A6C34878D82A}">
+                    <a16:rowId xmlns:a16="http://schemas.microsoft.com/office/drawing/2014/main" val="976755942"/>
+                  </a:ext>
+                </a:extLst>
+              </a:tr>
+              <a:tr h="424282">
+                <a:tc>
+                  <a:txBody>
+                    <a:bodyPr/>
+                    <a:lstStyle/>
+                    <a:p>
+                      <a:r>
+                        <a:rPr lang="en-US" dirty="0"/>
+                        <a:t>24</a:t>
+                      </a:r>
+                    </a:p>
+                  </a:txBody>
+                  <a:tcPr/>
+                </a:tc>
+                <a:tc>
+                  <a:txBody>
+                    <a:bodyPr/>
+                    <a:lstStyle/>
+                    <a:p>
+                      <a:r>
+                        <a:rPr lang="en-US" dirty="0"/>
+                        <a:t>M</a:t>
+                      </a:r>
+                    </a:p>
+                  </a:txBody>
+                  <a:tcPr/>
+                </a:tc>
+                <a:tc>
+                  <a:txBody>
+                    <a:bodyPr/>
+                    <a:lstStyle/>
+                    <a:p>
+                      <a:r>
+                        <a:rPr lang="en-US" dirty="0"/>
+                        <a:t>3</a:t>
+                      </a:r>
+                    </a:p>
+                  </a:txBody>
+                  <a:tcPr/>
+                </a:tc>
+                <a:tc>
+                  <a:txBody>
+                    <a:bodyPr/>
+                    <a:lstStyle/>
+                    <a:p>
+                      <a:r>
+                        <a:rPr lang="en-US" dirty="0"/>
+                        <a:t>Bronze</a:t>
+                      </a:r>
+                    </a:p>
+                  </a:txBody>
+                  <a:tcPr/>
+                </a:tc>
+                <a:tc>
+                  <a:txBody>
+                    <a:bodyPr/>
+                    <a:lstStyle/>
+                    <a:p>
+                      <a:r>
+                        <a:rPr lang="en-US" dirty="0"/>
+                        <a:t>0</a:t>
+                      </a:r>
+                    </a:p>
+                  </a:txBody>
+                  <a:tcPr/>
+                </a:tc>
+                <a:extLst>
+                  <a:ext uri="{0D108BD9-81ED-4DB2-BD59-A6C34878D82A}">
+                    <a16:rowId xmlns:a16="http://schemas.microsoft.com/office/drawing/2014/main" val="2401095080"/>
+                  </a:ext>
+                </a:extLst>
+              </a:tr>
+              <a:tr h="424282">
+                <a:tc>
+                  <a:txBody>
+                    <a:bodyPr/>
+                    <a:lstStyle/>
+                    <a:p>
+                      <a:r>
+                        <a:rPr lang="en-US" dirty="0"/>
+                        <a:t>26</a:t>
+                      </a:r>
+                    </a:p>
+                  </a:txBody>
+                  <a:tcPr/>
+                </a:tc>
+                <a:tc>
+                  <a:txBody>
+                    <a:bodyPr/>
+                    <a:lstStyle/>
+                    <a:p>
+                      <a:r>
+                        <a:rPr lang="en-US" dirty="0"/>
+                        <a:t>M</a:t>
+                      </a:r>
+                    </a:p>
+                  </a:txBody>
+                  <a:tcPr/>
+                </a:tc>
+                <a:tc>
+                  <a:txBody>
+                    <a:bodyPr/>
+                    <a:lstStyle/>
+                    <a:p>
+                      <a:r>
+                        <a:rPr lang="en-US" dirty="0"/>
+                        <a:t>3</a:t>
+                      </a:r>
+                    </a:p>
+                  </a:txBody>
+                  <a:tcPr/>
+                </a:tc>
+                <a:tc>
+                  <a:txBody>
+                    <a:bodyPr/>
+                    <a:lstStyle/>
+                    <a:p>
+                      <a:r>
+                        <a:rPr lang="en-US" dirty="0"/>
+                        <a:t>Platinum</a:t>
+                      </a:r>
+                    </a:p>
+                  </a:txBody>
+                  <a:tcPr/>
+                </a:tc>
+                <a:tc>
+                  <a:txBody>
+                    <a:bodyPr/>
+                    <a:lstStyle/>
+                    <a:p>
+                      <a:r>
+                        <a:rPr lang="en-US" dirty="0"/>
+                        <a:t>27833</a:t>
+                      </a:r>
+                    </a:p>
+                  </a:txBody>
+                  <a:tcPr/>
+                </a:tc>
+                <a:extLst>
+                  <a:ext uri="{0D108BD9-81ED-4DB2-BD59-A6C34878D82A}">
+                    <a16:rowId xmlns:a16="http://schemas.microsoft.com/office/drawing/2014/main" val="1167859313"/>
+                  </a:ext>
+                </a:extLst>
+              </a:tr>
+              <a:tr h="424282">
+                <a:tc>
+                  <a:txBody>
+                    <a:bodyPr/>
+                    <a:lstStyle/>
+                    <a:p>
+                      <a:r>
+                        <a:rPr lang="en-US" dirty="0"/>
+                        <a:t>25</a:t>
+                      </a:r>
+                    </a:p>
+                  </a:txBody>
+                  <a:tcPr/>
+                </a:tc>
+                <a:tc>
+                  <a:txBody>
+                    <a:bodyPr/>
+                    <a:lstStyle/>
+                    <a:p>
+                      <a:r>
+                        <a:rPr lang="en-US" dirty="0"/>
+                        <a:t>F</a:t>
+                      </a:r>
+                    </a:p>
+                  </a:txBody>
+                  <a:tcPr/>
+                </a:tc>
+                <a:tc>
+                  <a:txBody>
+                    <a:bodyPr/>
+                    <a:lstStyle/>
+                    <a:p>
+                      <a:r>
+                        <a:rPr lang="en-US" dirty="0"/>
+                        <a:t>3</a:t>
+                      </a:r>
+                    </a:p>
+                  </a:txBody>
+                  <a:tcPr/>
+                </a:tc>
+                <a:tc>
+                  <a:txBody>
+                    <a:bodyPr/>
+                    <a:lstStyle/>
+                    <a:p>
+                      <a:r>
+                        <a:rPr lang="en-US" dirty="0"/>
+                        <a:t>Silver</a:t>
+                      </a:r>
+                    </a:p>
+                  </a:txBody>
+                  <a:tcPr/>
+                </a:tc>
+                <a:tc>
+                  <a:txBody>
+                    <a:bodyPr/>
+                    <a:lstStyle/>
+                    <a:p>
+                      <a:r>
+                        <a:rPr lang="en-US" dirty="0"/>
+                        <a:t>15000</a:t>
+                      </a:r>
+                    </a:p>
+                  </a:txBody>
+                  <a:tcPr/>
+                </a:tc>
+                <a:extLst>
+                  <a:ext uri="{0D108BD9-81ED-4DB2-BD59-A6C34878D82A}">
+                    <a16:rowId xmlns:a16="http://schemas.microsoft.com/office/drawing/2014/main" val="799557319"/>
+                  </a:ext>
+                </a:extLst>
+              </a:tr>
+            </a:tbl>
+          </a:graphicData>
+        </a:graphic>
+      </p:graphicFrame>
+    </p:spTree>
+    <p:extLst>
+      <p:ext uri="{BB962C8B-B14F-4D97-AF65-F5344CB8AC3E}">
+        <p14:creationId xmlns:p14="http://schemas.microsoft.com/office/powerpoint/2010/main" val="4284871391"/>
+      </p:ext>
+    </p:extLst>
+  </p:cSld>
+  <p:clrMapOvr>
+    <a:masterClrMapping/>
+  </p:clrMapOvr>
+</p:sld>
+</file>
+
+<file path=ppt/slides/slide24.xml><?xml version="1.0" encoding="utf-8"?>
+<p:sld xmlns:a="http://schemas.openxmlformats.org/drawingml/2006/main" xmlns:r="http://schemas.openxmlformats.org/officeDocument/2006/relationships" xmlns:p="http://schemas.openxmlformats.org/presentationml/2006/main">
+  <p:cSld>
+    <p:spTree>
+      <p:nvGrpSpPr>
+        <p:cNvPr id="1" name=""/>
+        <p:cNvGrpSpPr/>
+        <p:nvPr/>
+      </p:nvGrpSpPr>
+      <p:grpSpPr>
+        <a:xfrm>
+          <a:off x="0" y="0"/>
+          <a:ext cx="0" cy="0"/>
+          <a:chOff x="0" y="0"/>
+          <a:chExt cx="0" cy="0"/>
+        </a:xfrm>
+      </p:grpSpPr>
+      <p:sp>
+        <p:nvSpPr>
+          <p:cNvPr id="2" name="Title 1"/>
+          <p:cNvSpPr>
+            <a:spLocks noGrp="1"/>
+          </p:cNvSpPr>
+          <p:nvPr>
+            <p:ph type="title"/>
+          </p:nvPr>
+        </p:nvSpPr>
+        <p:spPr/>
+        <p:txBody>
+          <a:bodyPr/>
+          <a:lstStyle/>
+          <a:p>
+            <a:r>
+              <a:rPr lang="en-US" dirty="0"/>
               <a:t>Let’s Explore!</a:t>
             </a:r>
           </a:p>
@@ -7441,7 +7997,7 @@
 </p:sld>
 </file>
 
-<file path=ppt/slides/slide24.xml><?xml version="1.0" encoding="utf-8"?>
+<file path=ppt/slides/slide25.xml><?xml version="1.0" encoding="utf-8"?>
 <p:sld xmlns:a="http://schemas.openxmlformats.org/drawingml/2006/main" xmlns:r="http://schemas.openxmlformats.org/officeDocument/2006/relationships" xmlns:p="http://schemas.openxmlformats.org/presentationml/2006/main">
   <p:cSld>
     <p:spTree>

</xml_diff>